<commit_message>
updated Day 4 Supporting Materials
</commit_message>
<xml_diff>
--- a/Day 3/Slides/9. Arrays/arrays-slides.pptx
+++ b/Day 3/Slides/9. Arrays/arrays-slides.pptx
@@ -5,34 +5,34 @@
     <p:sldMasterId id="2147483648" r:id="rId1"/>
   </p:sldMasterIdLst>
   <p:notesMasterIdLst>
-    <p:notesMasterId r:id="rId28"/>
+    <p:notesMasterId r:id="rId27"/>
   </p:notesMasterIdLst>
   <p:sldIdLst>
-    <p:sldId id="256" r:id="rId3"/>
-    <p:sldId id="257" r:id="rId4"/>
-    <p:sldId id="258" r:id="rId5"/>
-    <p:sldId id="264" r:id="rId6"/>
-    <p:sldId id="265" r:id="rId7"/>
-    <p:sldId id="271" r:id="rId8"/>
-    <p:sldId id="268" r:id="rId9"/>
-    <p:sldId id="266" r:id="rId10"/>
-    <p:sldId id="269" r:id="rId11"/>
-    <p:sldId id="272" r:id="rId12"/>
-    <p:sldId id="273" r:id="rId13"/>
-    <p:sldId id="274" r:id="rId14"/>
-    <p:sldId id="275" r:id="rId15"/>
-    <p:sldId id="263" r:id="rId16"/>
-    <p:sldId id="267" r:id="rId17"/>
-    <p:sldId id="276" r:id="rId18"/>
-    <p:sldId id="277" r:id="rId19"/>
-    <p:sldId id="278" r:id="rId20"/>
-    <p:sldId id="279" r:id="rId21"/>
-    <p:sldId id="280" r:id="rId22"/>
-    <p:sldId id="281" r:id="rId23"/>
-    <p:sldId id="282" r:id="rId24"/>
-    <p:sldId id="283" r:id="rId25"/>
-    <p:sldId id="270" r:id="rId26"/>
-    <p:sldId id="284" r:id="rId27"/>
+    <p:sldId id="256" r:id="rId2"/>
+    <p:sldId id="257" r:id="rId3"/>
+    <p:sldId id="258" r:id="rId4"/>
+    <p:sldId id="264" r:id="rId5"/>
+    <p:sldId id="265" r:id="rId6"/>
+    <p:sldId id="271" r:id="rId7"/>
+    <p:sldId id="268" r:id="rId8"/>
+    <p:sldId id="266" r:id="rId9"/>
+    <p:sldId id="269" r:id="rId10"/>
+    <p:sldId id="272" r:id="rId11"/>
+    <p:sldId id="273" r:id="rId12"/>
+    <p:sldId id="274" r:id="rId13"/>
+    <p:sldId id="275" r:id="rId14"/>
+    <p:sldId id="263" r:id="rId15"/>
+    <p:sldId id="267" r:id="rId16"/>
+    <p:sldId id="276" r:id="rId17"/>
+    <p:sldId id="277" r:id="rId18"/>
+    <p:sldId id="278" r:id="rId19"/>
+    <p:sldId id="279" r:id="rId20"/>
+    <p:sldId id="280" r:id="rId21"/>
+    <p:sldId id="281" r:id="rId22"/>
+    <p:sldId id="282" r:id="rId23"/>
+    <p:sldId id="283" r:id="rId24"/>
+    <p:sldId id="270" r:id="rId25"/>
+    <p:sldId id="284" r:id="rId26"/>
   </p:sldIdLst>
   <p:sldSz cx="12192000" cy="6858000"/>
   <p:notesSz cx="12192000" cy="6858000"/>
@@ -128,6 +128,22 @@
       </a:defRPr>
     </a:lvl9pPr>
   </p:defaultTextStyle>
+  <p:extLst>
+    <p:ext uri="{EFAFB233-063F-42B5-8137-9DF3F51BA10A}">
+      <p15:sldGuideLst xmlns:p15="http://schemas.microsoft.com/office/powerpoint/2012/main">
+        <p15:guide id="1" orient="horz" pos="2880">
+          <p15:clr>
+            <a:srgbClr val="A4A3A4"/>
+          </p15:clr>
+        </p15:guide>
+        <p15:guide id="2" pos="2147">
+          <p15:clr>
+            <a:srgbClr val="A4A3A4"/>
+          </p15:clr>
+        </p15:guide>
+      </p15:sldGuideLst>
+    </p:ext>
+  </p:extLst>
 </p:presentation>
 </file>
 
@@ -213,6 +229,7 @@
           <a:p>
             <a:fld id="{3EFD42F7-718C-4B98-AAEC-167E6DDD60A7}" type="datetimeFigureOut">
               <a:rPr lang="en-US" smtClean="0"/>
+              <a:t>8/2/2023</a:t>
             </a:fld>
             <a:endParaRPr lang="en-US"/>
           </a:p>
@@ -276,42 +293,37 @@
           <a:p>
             <a:pPr lvl="0"/>
             <a:r>
-              <a:rPr lang="en-US" smtClean="0"/>
+              <a:rPr lang="en-US"/>
               <a:t>Click to edit Master text styles</a:t>
             </a:r>
-            <a:endParaRPr lang="en-US" smtClean="0"/>
           </a:p>
           <a:p>
             <a:pPr lvl="1"/>
             <a:r>
-              <a:rPr lang="en-US" smtClean="0"/>
+              <a:rPr lang="en-US"/>
               <a:t>Second level</a:t>
             </a:r>
-            <a:endParaRPr lang="en-US" smtClean="0"/>
           </a:p>
           <a:p>
             <a:pPr lvl="2"/>
             <a:r>
-              <a:rPr lang="en-US" smtClean="0"/>
+              <a:rPr lang="en-US"/>
               <a:t>Third level</a:t>
             </a:r>
-            <a:endParaRPr lang="en-US" smtClean="0"/>
           </a:p>
           <a:p>
             <a:pPr lvl="3"/>
             <a:r>
-              <a:rPr lang="en-US" smtClean="0"/>
+              <a:rPr lang="en-US"/>
               <a:t>Fourth level</a:t>
             </a:r>
-            <a:endParaRPr lang="en-US" smtClean="0"/>
           </a:p>
           <a:p>
             <a:pPr lvl="4"/>
             <a:r>
-              <a:rPr lang="en-US" smtClean="0"/>
+              <a:rPr lang="en-US"/>
               <a:t>Fifth level</a:t>
             </a:r>
-            <a:endParaRPr lang="en-US"/>
           </a:p>
         </p:txBody>
       </p:sp>
@@ -375,6 +387,7 @@
           <a:p>
             <a:fld id="{21B2AA4F-B828-4D7C-AFD3-893933DAFCB4}" type="slidenum">
               <a:rPr lang="en-US" smtClean="0"/>
+              <a:t>‹#›</a:t>
             </a:fld>
             <a:endParaRPr lang="en-US"/>
           </a:p>
@@ -479,7 +492,7 @@
 </file>
 
 <file path=ppt/slideLayouts/slideLayout1.xml><?xml version="1.0" encoding="utf-8"?>
-<p:sldLayout xmlns:a="http://schemas.openxmlformats.org/drawingml/2006/main" xmlns:r="http://schemas.openxmlformats.org/officeDocument/2006/relationships" xmlns:p="http://schemas.openxmlformats.org/presentationml/2006/main" type="obj" preserve="1" showMasterSp="0">
+<p:sldLayout xmlns:a="http://schemas.openxmlformats.org/drawingml/2006/main" xmlns:r="http://schemas.openxmlformats.org/officeDocument/2006/relationships" xmlns:p="http://schemas.openxmlformats.org/presentationml/2006/main" showMasterSp="0" type="obj" preserve="1">
   <p:cSld name="Title Slide">
     <p:bg>
       <p:bgPr>
@@ -548,7 +561,9 @@
         <p:txBody>
           <a:bodyPr wrap="square" lIns="0" tIns="0" rIns="0" bIns="0" rtlCol="0"/>
           <a:lstStyle/>
-          <a:p/>
+          <a:p>
+            <a:endParaRPr/>
+          </a:p>
         </p:txBody>
       </p:sp>
       <p:sp>
@@ -583,7 +598,9 @@
               </a:defRPr>
             </a:lvl1pPr>
           </a:lstStyle>
-          <a:p/>
+          <a:p>
+            <a:endParaRPr/>
+          </a:p>
         </p:txBody>
       </p:sp>
       <p:sp>
@@ -614,7 +631,9 @@
               <a:defRPr/>
             </a:lvl1pPr>
           </a:lstStyle>
-          <a:p/>
+          <a:p>
+            <a:endParaRPr/>
+          </a:p>
         </p:txBody>
       </p:sp>
       <p:sp>
@@ -641,7 +660,9 @@
               </a:defRPr>
             </a:lvl1pPr>
           </a:lstStyle>
-          <a:p/>
+          <a:p>
+            <a:endParaRPr/>
+          </a:p>
         </p:txBody>
       </p:sp>
       <p:sp>
@@ -671,6 +692,7 @@
           <a:p>
             <a:fld id="{1D8BD707-D9CF-40AE-B4C6-C98DA3205C09}" type="datetimeFigureOut">
               <a:rPr lang="en-US"/>
+              <a:t>8/2/2023</a:t>
             </a:fld>
             <a:endParaRPr lang="en-US"/>
           </a:p>
@@ -703,6 +725,7 @@
           <a:p>
             <a:fld id="{B6F15528-21DE-4FAA-801E-634DDDAF4B2B}" type="slidenum">
               <a:rPr/>
+              <a:t>‹#›</a:t>
             </a:fld>
             <a:endParaRPr/>
           </a:p>
@@ -718,7 +741,7 @@
 </file>
 
 <file path=ppt/slideLayouts/slideLayout2.xml><?xml version="1.0" encoding="utf-8"?>
-<p:sldLayout xmlns:a="http://schemas.openxmlformats.org/drawingml/2006/main" xmlns:r="http://schemas.openxmlformats.org/officeDocument/2006/relationships" xmlns:p="http://schemas.openxmlformats.org/presentationml/2006/main" type="obj" preserve="1" showMasterSp="0">
+<p:sldLayout xmlns:a="http://schemas.openxmlformats.org/drawingml/2006/main" xmlns:r="http://schemas.openxmlformats.org/officeDocument/2006/relationships" xmlns:p="http://schemas.openxmlformats.org/presentationml/2006/main" showMasterSp="0" type="obj" preserve="1">
   <p:cSld name="Title and Content">
     <p:bg>
       <p:bgPr>
@@ -787,7 +810,9 @@
         <p:txBody>
           <a:bodyPr wrap="square" lIns="0" tIns="0" rIns="0" bIns="0" rtlCol="0"/>
           <a:lstStyle/>
-          <a:p/>
+          <a:p>
+            <a:endParaRPr/>
+          </a:p>
         </p:txBody>
       </p:sp>
       <p:sp>
@@ -814,7 +839,9 @@
               </a:defRPr>
             </a:lvl1pPr>
           </a:lstStyle>
-          <a:p/>
+          <a:p>
+            <a:endParaRPr/>
+          </a:p>
         </p:txBody>
       </p:sp>
       <p:sp>
@@ -839,7 +866,9 @@
               </a:defRPr>
             </a:lvl1pPr>
           </a:lstStyle>
-          <a:p/>
+          <a:p>
+            <a:endParaRPr/>
+          </a:p>
         </p:txBody>
       </p:sp>
       <p:sp>
@@ -866,7 +895,9 @@
               </a:defRPr>
             </a:lvl1pPr>
           </a:lstStyle>
-          <a:p/>
+          <a:p>
+            <a:endParaRPr/>
+          </a:p>
         </p:txBody>
       </p:sp>
       <p:sp>
@@ -896,6 +927,7 @@
           <a:p>
             <a:fld id="{1D8BD707-D9CF-40AE-B4C6-C98DA3205C09}" type="datetimeFigureOut">
               <a:rPr lang="en-US"/>
+              <a:t>8/2/2023</a:t>
             </a:fld>
             <a:endParaRPr lang="en-US"/>
           </a:p>
@@ -928,6 +960,7 @@
           <a:p>
             <a:fld id="{B6F15528-21DE-4FAA-801E-634DDDAF4B2B}" type="slidenum">
               <a:rPr/>
+              <a:t>‹#›</a:t>
             </a:fld>
             <a:endParaRPr/>
           </a:p>
@@ -983,7 +1016,9 @@
               </a:defRPr>
             </a:lvl1pPr>
           </a:lstStyle>
-          <a:p/>
+          <a:p>
+            <a:endParaRPr/>
+          </a:p>
         </p:txBody>
       </p:sp>
       <p:sp>
@@ -1014,7 +1049,9 @@
               <a:defRPr/>
             </a:lvl1pPr>
           </a:lstStyle>
-          <a:p/>
+          <a:p>
+            <a:endParaRPr/>
+          </a:p>
         </p:txBody>
       </p:sp>
       <p:sp>
@@ -1045,7 +1082,9 @@
               <a:defRPr/>
             </a:lvl1pPr>
           </a:lstStyle>
-          <a:p/>
+          <a:p>
+            <a:endParaRPr/>
+          </a:p>
         </p:txBody>
       </p:sp>
       <p:sp>
@@ -1072,7 +1111,9 @@
               </a:defRPr>
             </a:lvl1pPr>
           </a:lstStyle>
-          <a:p/>
+          <a:p>
+            <a:endParaRPr/>
+          </a:p>
         </p:txBody>
       </p:sp>
       <p:sp>
@@ -1102,6 +1143,7 @@
           <a:p>
             <a:fld id="{1D8BD707-D9CF-40AE-B4C6-C98DA3205C09}" type="datetimeFigureOut">
               <a:rPr lang="en-US"/>
+              <a:t>8/2/2023</a:t>
             </a:fld>
             <a:endParaRPr lang="en-US"/>
           </a:p>
@@ -1134,6 +1176,7 @@
           <a:p>
             <a:fld id="{B6F15528-21DE-4FAA-801E-634DDDAF4B2B}" type="slidenum">
               <a:rPr/>
+              <a:t>‹#›</a:t>
             </a:fld>
             <a:endParaRPr/>
           </a:p>
@@ -1149,7 +1192,7 @@
 </file>
 
 <file path=ppt/slideLayouts/slideLayout4.xml><?xml version="1.0" encoding="utf-8"?>
-<p:sldLayout xmlns:a="http://schemas.openxmlformats.org/drawingml/2006/main" xmlns:r="http://schemas.openxmlformats.org/officeDocument/2006/relationships" xmlns:p="http://schemas.openxmlformats.org/presentationml/2006/main" type="obj" preserve="1" showMasterSp="0">
+<p:sldLayout xmlns:a="http://schemas.openxmlformats.org/drawingml/2006/main" xmlns:r="http://schemas.openxmlformats.org/officeDocument/2006/relationships" xmlns:p="http://schemas.openxmlformats.org/presentationml/2006/main" showMasterSp="0" type="obj" preserve="1">
   <p:cSld name="Title Only">
     <p:bg>
       <p:bgPr>
@@ -1219,7 +1262,9 @@
               </a:defRPr>
             </a:lvl1pPr>
           </a:lstStyle>
-          <a:p/>
+          <a:p>
+            <a:endParaRPr/>
+          </a:p>
         </p:txBody>
       </p:sp>
       <p:sp>
@@ -1246,7 +1291,9 @@
               </a:defRPr>
             </a:lvl1pPr>
           </a:lstStyle>
-          <a:p/>
+          <a:p>
+            <a:endParaRPr/>
+          </a:p>
         </p:txBody>
       </p:sp>
       <p:sp>
@@ -1276,6 +1323,7 @@
           <a:p>
             <a:fld id="{1D8BD707-D9CF-40AE-B4C6-C98DA3205C09}" type="datetimeFigureOut">
               <a:rPr lang="en-US"/>
+              <a:t>8/2/2023</a:t>
             </a:fld>
             <a:endParaRPr lang="en-US"/>
           </a:p>
@@ -1308,6 +1356,7 @@
           <a:p>
             <a:fld id="{B6F15528-21DE-4FAA-801E-634DDDAF4B2B}" type="slidenum">
               <a:rPr/>
+              <a:t>‹#›</a:t>
             </a:fld>
             <a:endParaRPr/>
           </a:p>
@@ -1363,7 +1412,9 @@
               </a:defRPr>
             </a:lvl1pPr>
           </a:lstStyle>
-          <a:p/>
+          <a:p>
+            <a:endParaRPr/>
+          </a:p>
         </p:txBody>
       </p:sp>
       <p:sp>
@@ -1393,6 +1444,7 @@
           <a:p>
             <a:fld id="{1D8BD707-D9CF-40AE-B4C6-C98DA3205C09}" type="datetimeFigureOut">
               <a:rPr lang="en-US"/>
+              <a:t>8/2/2023</a:t>
             </a:fld>
             <a:endParaRPr lang="en-US"/>
           </a:p>
@@ -1425,6 +1477,7 @@
           <a:p>
             <a:fld id="{B6F15528-21DE-4FAA-801E-634DDDAF4B2B}" type="slidenum">
               <a:rPr/>
+              <a:t>‹#›</a:t>
             </a:fld>
             <a:endParaRPr/>
           </a:p>
@@ -1472,10 +1525,9 @@
           <a:lstStyle/>
           <a:p>
             <a:r>
-              <a:rPr lang="en-US" smtClean="0"/>
+              <a:rPr lang="en-US"/>
               <a:t>Click to edit Master title style</a:t>
             </a:r>
-            <a:endParaRPr lang="en-US"/>
           </a:p>
         </p:txBody>
       </p:sp>
@@ -1496,42 +1548,37 @@
           <a:p>
             <a:pPr lvl="0"/>
             <a:r>
-              <a:rPr lang="en-US" smtClean="0"/>
+              <a:rPr lang="en-US"/>
               <a:t>Click to edit Master text styles</a:t>
             </a:r>
-            <a:endParaRPr lang="en-US" smtClean="0"/>
           </a:p>
           <a:p>
             <a:pPr lvl="1"/>
             <a:r>
-              <a:rPr lang="en-US" smtClean="0"/>
+              <a:rPr lang="en-US"/>
               <a:t>Second level</a:t>
             </a:r>
-            <a:endParaRPr lang="en-US" smtClean="0"/>
           </a:p>
           <a:p>
             <a:pPr lvl="2"/>
             <a:r>
-              <a:rPr lang="en-US" smtClean="0"/>
+              <a:rPr lang="en-US"/>
               <a:t>Third level</a:t>
             </a:r>
-            <a:endParaRPr lang="en-US" smtClean="0"/>
           </a:p>
           <a:p>
             <a:pPr lvl="3"/>
             <a:r>
-              <a:rPr lang="en-US" smtClean="0"/>
+              <a:rPr lang="en-US"/>
               <a:t>Fourth level</a:t>
             </a:r>
-            <a:endParaRPr lang="en-US" smtClean="0"/>
           </a:p>
           <a:p>
             <a:pPr lvl="4"/>
             <a:r>
-              <a:rPr lang="en-US" smtClean="0"/>
+              <a:rPr lang="en-US"/>
               <a:t>Fifth level</a:t>
             </a:r>
-            <a:endParaRPr lang="en-US"/>
           </a:p>
         </p:txBody>
       </p:sp>
@@ -1552,6 +1599,7 @@
           <a:p>
             <a:fld id="{1D8BD707-D9CF-40AE-B4C6-C98DA3205C09}" type="datetimeFigureOut">
               <a:rPr lang="en-US"/>
+              <a:t>8/2/2023</a:t>
             </a:fld>
             <a:endParaRPr lang="en-US"/>
           </a:p>
@@ -1571,7 +1619,9 @@
         <p:txBody>
           <a:bodyPr/>
           <a:lstStyle/>
-          <a:p/>
+          <a:p>
+            <a:endParaRPr/>
+          </a:p>
         </p:txBody>
       </p:sp>
       <p:sp>
@@ -1591,6 +1641,7 @@
           <a:p>
             <a:fld id="{B6F15528-21DE-4FAA-801E-634DDDAF4B2B}" type="slidenum">
               <a:rPr/>
+              <a:t>‹#›</a:t>
             </a:fld>
             <a:endParaRPr/>
           </a:p>
@@ -1663,7 +1714,9 @@
               </a:defRPr>
             </a:lvl1pPr>
           </a:lstStyle>
-          <a:p/>
+          <a:p>
+            <a:endParaRPr/>
+          </a:p>
         </p:txBody>
       </p:sp>
       <p:sp>
@@ -1698,7 +1751,9 @@
               </a:defRPr>
             </a:lvl1pPr>
           </a:lstStyle>
-          <a:p/>
+          <a:p>
+            <a:endParaRPr/>
+          </a:p>
         </p:txBody>
       </p:sp>
       <p:sp>
@@ -1735,7 +1790,9 @@
               </a:defRPr>
             </a:lvl1pPr>
           </a:lstStyle>
-          <a:p/>
+          <a:p>
+            <a:endParaRPr/>
+          </a:p>
         </p:txBody>
       </p:sp>
       <p:sp>
@@ -1775,6 +1832,7 @@
           <a:p>
             <a:fld id="{1D8BD707-D9CF-40AE-B4C6-C98DA3205C09}" type="datetimeFigureOut">
               <a:rPr lang="en-US"/>
+              <a:t>8/2/2023</a:t>
             </a:fld>
             <a:endParaRPr lang="en-US"/>
           </a:p>
@@ -1817,6 +1875,7 @@
           <a:p>
             <a:fld id="{B6F15528-21DE-4FAA-801E-634DDDAF4B2B}" type="slidenum">
               <a:rPr/>
+              <a:t>‹#›</a:t>
             </a:fld>
             <a:endParaRPr/>
           </a:p>
@@ -2002,7 +2061,7 @@
           <p:nvPr/>
         </p:nvPicPr>
         <p:blipFill>
-          <a:blip r:embed="rId1" cstate="print"/>
+          <a:blip r:embed="rId2" cstate="print"/>
           <a:stretch>
             <a:fillRect/>
           </a:stretch>
@@ -2115,9 +2174,11 @@
         <p:spPr/>
         <p:txBody>
           <a:bodyPr/>
+          <a:lstStyle/>
           <a:p>
             <a:fld id="{B6F15528-21DE-4FAA-801E-634DDDAF4B2B}" type="slidenum">
               <a:rPr/>
+              <a:t>1</a:t>
             </a:fld>
             <a:endParaRPr/>
           </a:p>
@@ -2140,7 +2201,14 @@
         <p:cNvGrpSpPr/>
         <p:nvPr/>
       </p:nvGrpSpPr>
-      <p:grpSpPr/>
+      <p:grpSpPr>
+        <a:xfrm>
+          <a:off x="0" y="0"/>
+          <a:ext cx="0" cy="0"/>
+          <a:chOff x="0" y="0"/>
+          <a:chExt cx="0" cy="0"/>
+        </a:xfrm>
+      </p:grpSpPr>
       <p:sp>
         <p:nvSpPr>
           <p:cNvPr id="7" name="Title 6"/>
@@ -2154,6 +2222,7 @@
         <p:spPr/>
         <p:txBody>
           <a:bodyPr/>
+          <a:lstStyle/>
           <a:p>
             <a:endParaRPr lang="en-US"/>
           </a:p>
@@ -2172,9 +2241,11 @@
         <p:spPr/>
         <p:txBody>
           <a:bodyPr/>
+          <a:lstStyle/>
           <a:p>
             <a:fld id="{B6F15528-21DE-4FAA-801E-634DDDAF4B2B}" type="slidenum">
               <a:rPr/>
+              <a:t>10</a:t>
             </a:fld>
             <a:endParaRPr/>
           </a:p>
@@ -2193,6 +2264,7 @@
         <p:spPr/>
         <p:txBody>
           <a:bodyPr/>
+          <a:lstStyle/>
           <a:p>
             <a:endParaRPr lang="en-US"/>
           </a:p>
@@ -2202,7 +2274,7 @@
         <p:nvGraphicFramePr>
           <p:cNvPr id="12" name="Content Placeholder 11"/>
           <p:cNvGraphicFramePr>
-            <a:graphicFrameLocks noChangeAspect="1"/>
+            <a:graphicFrameLocks noGrp="1" noChangeAspect="1"/>
           </p:cNvGraphicFramePr>
           <p:nvPr>
             <p:ph sz="half" idx="2"/>
@@ -2216,12 +2288,12 @@
           <a:graphicData uri="http://schemas.openxmlformats.org/presentationml/2006/ole">
             <mc:AlternateContent xmlns:mc="http://schemas.openxmlformats.org/markup-compatibility/2006">
               <mc:Choice xmlns:v="urn:schemas-microsoft-com:vml" Requires="v">
-                <p:oleObj spid="_x0000_s13" name="" r:id="rId1" imgW="11505565" imgH="6753225" progId="Paint.Picture">
+                <p:oleObj r:id="rId2" imgW="11505565" imgH="6753225" progId="Paint.Picture">
                   <p:embed/>
                 </p:oleObj>
               </mc:Choice>
               <mc:Fallback>
-                <p:oleObj name="" r:id="rId1" imgW="11505565" imgH="6753225" progId="Paint.Picture">
+                <p:oleObj r:id="rId2" imgW="11505565" imgH="6753225" progId="Paint.Picture">
                   <p:embed/>
                   <p:pic>
                     <p:nvPicPr>
@@ -2230,7 +2302,7 @@
                       <p:nvPr/>
                     </p:nvPicPr>
                     <p:blipFill>
-                      <a:blip r:embed="rId2"/>
+                      <a:blip r:embed="rId3"/>
                       <a:stretch>
                         <a:fillRect/>
                       </a:stretch>
@@ -2268,7 +2340,14 @@
         <p:cNvGrpSpPr/>
         <p:nvPr/>
       </p:nvGrpSpPr>
-      <p:grpSpPr/>
+      <p:grpSpPr>
+        <a:xfrm>
+          <a:off x="0" y="0"/>
+          <a:ext cx="0" cy="0"/>
+          <a:chOff x="0" y="0"/>
+          <a:chExt cx="0" cy="0"/>
+        </a:xfrm>
+      </p:grpSpPr>
       <p:sp>
         <p:nvSpPr>
           <p:cNvPr id="4" name="Slide Number Placeholder 3"/>
@@ -2287,9 +2366,11 @@
         </p:spPr>
         <p:txBody>
           <a:bodyPr/>
+          <a:lstStyle/>
           <a:p>
             <a:fld id="{B6F15528-21DE-4FAA-801E-634DDDAF4B2B}" type="slidenum">
               <a:rPr/>
+              <a:t>11</a:t>
             </a:fld>
             <a:endParaRPr/>
           </a:p>
@@ -2309,12 +2390,12 @@
           <a:graphicData uri="http://schemas.openxmlformats.org/presentationml/2006/ole">
             <mc:AlternateContent xmlns:mc="http://schemas.openxmlformats.org/markup-compatibility/2006">
               <mc:Choice xmlns:v="urn:schemas-microsoft-com:vml" Requires="v">
-                <p:oleObj spid="_x0000_s6" name="" r:id="rId1" imgW="10448925" imgH="5267325" progId="Paint.Picture">
+                <p:oleObj r:id="rId2" imgW="10448925" imgH="5267325" progId="Paint.Picture">
                   <p:embed/>
                 </p:oleObj>
               </mc:Choice>
               <mc:Fallback>
-                <p:oleObj name="" r:id="rId1" imgW="10448925" imgH="5267325" progId="Paint.Picture">
+                <p:oleObj r:id="rId2" imgW="10448925" imgH="5267325" progId="Paint.Picture">
                   <p:embed/>
                   <p:pic>
                     <p:nvPicPr>
@@ -2323,7 +2404,7 @@
                       <p:nvPr/>
                     </p:nvPicPr>
                     <p:blipFill>
-                      <a:blip r:embed="rId2"/>
+                      <a:blip r:embed="rId3"/>
                       <a:stretch>
                         <a:fillRect/>
                       </a:stretch>
@@ -2361,7 +2442,14 @@
         <p:cNvGrpSpPr/>
         <p:nvPr/>
       </p:nvGrpSpPr>
-      <p:grpSpPr/>
+      <p:grpSpPr>
+        <a:xfrm>
+          <a:off x="0" y="0"/>
+          <a:ext cx="0" cy="0"/>
+          <a:chOff x="0" y="0"/>
+          <a:chExt cx="0" cy="0"/>
+        </a:xfrm>
+      </p:grpSpPr>
       <p:sp>
         <p:nvSpPr>
           <p:cNvPr id="4" name="Slide Number Placeholder 3"/>
@@ -2380,9 +2468,11 @@
         </p:spPr>
         <p:txBody>
           <a:bodyPr/>
+          <a:lstStyle/>
           <a:p>
             <a:fld id="{B6F15528-21DE-4FAA-801E-634DDDAF4B2B}" type="slidenum">
               <a:rPr/>
+              <a:t>12</a:t>
             </a:fld>
             <a:endParaRPr/>
           </a:p>
@@ -2402,12 +2492,12 @@
           <a:graphicData uri="http://schemas.openxmlformats.org/presentationml/2006/ole">
             <mc:AlternateContent xmlns:mc="http://schemas.openxmlformats.org/markup-compatibility/2006">
               <mc:Choice xmlns:v="urn:schemas-microsoft-com:vml" Requires="v">
-                <p:oleObj spid="_x0000_s6" name="" r:id="rId1" imgW="10401300" imgH="5095875" progId="Paint.Picture">
+                <p:oleObj r:id="rId2" imgW="10401300" imgH="5095875" progId="Paint.Picture">
                   <p:embed/>
                 </p:oleObj>
               </mc:Choice>
               <mc:Fallback>
-                <p:oleObj name="" r:id="rId1" imgW="10401300" imgH="5095875" progId="Paint.Picture">
+                <p:oleObj r:id="rId2" imgW="10401300" imgH="5095875" progId="Paint.Picture">
                   <p:embed/>
                   <p:pic>
                     <p:nvPicPr>
@@ -2416,7 +2506,7 @@
                       <p:nvPr/>
                     </p:nvPicPr>
                     <p:blipFill>
-                      <a:blip r:embed="rId2"/>
+                      <a:blip r:embed="rId3"/>
                       <a:stretch>
                         <a:fillRect/>
                       </a:stretch>
@@ -2454,7 +2544,14 @@
         <p:cNvGrpSpPr/>
         <p:nvPr/>
       </p:nvGrpSpPr>
-      <p:grpSpPr/>
+      <p:grpSpPr>
+        <a:xfrm>
+          <a:off x="0" y="0"/>
+          <a:ext cx="0" cy="0"/>
+          <a:chOff x="0" y="0"/>
+          <a:chExt cx="0" cy="0"/>
+        </a:xfrm>
+      </p:grpSpPr>
       <p:sp>
         <p:nvSpPr>
           <p:cNvPr id="4" name="Slide Number Placeholder 3"/>
@@ -2473,9 +2570,11 @@
         </p:spPr>
         <p:txBody>
           <a:bodyPr/>
+          <a:lstStyle/>
           <a:p>
             <a:fld id="{B6F15528-21DE-4FAA-801E-634DDDAF4B2B}" type="slidenum">
               <a:rPr/>
+              <a:t>13</a:t>
             </a:fld>
             <a:endParaRPr/>
           </a:p>
@@ -2495,12 +2594,12 @@
           <a:graphicData uri="http://schemas.openxmlformats.org/presentationml/2006/ole">
             <mc:AlternateContent xmlns:mc="http://schemas.openxmlformats.org/markup-compatibility/2006">
               <mc:Choice xmlns:v="urn:schemas-microsoft-com:vml" Requires="v">
-                <p:oleObj spid="_x0000_s6" name="" r:id="rId1" imgW="10344150" imgH="5305425" progId="Paint.Picture">
+                <p:oleObj r:id="rId2" imgW="10344150" imgH="5305425" progId="Paint.Picture">
                   <p:embed/>
                 </p:oleObj>
               </mc:Choice>
               <mc:Fallback>
-                <p:oleObj name="" r:id="rId1" imgW="10344150" imgH="5305425" progId="Paint.Picture">
+                <p:oleObj r:id="rId2" imgW="10344150" imgH="5305425" progId="Paint.Picture">
                   <p:embed/>
                   <p:pic>
                     <p:nvPicPr>
@@ -2509,7 +2608,7 @@
                       <p:nvPr/>
                     </p:nvPicPr>
                     <p:blipFill>
-                      <a:blip r:embed="rId2"/>
+                      <a:blip r:embed="rId3"/>
                       <a:stretch>
                         <a:fillRect/>
                       </a:stretch>
@@ -2592,7 +2691,6 @@
               <a:rPr dirty="0"/>
               <a:t>slice() and splice()</a:t>
             </a:r>
-            <a:endParaRPr dirty="0"/>
           </a:p>
         </p:txBody>
       </p:sp>
@@ -2609,9 +2707,11 @@
         <p:spPr/>
         <p:txBody>
           <a:bodyPr/>
+          <a:lstStyle/>
           <a:p>
             <a:fld id="{B6F15528-21DE-4FAA-801E-634DDDAF4B2B}" type="slidenum">
               <a:rPr/>
+              <a:t>14</a:t>
             </a:fld>
             <a:endParaRPr/>
           </a:p>
@@ -2655,9 +2755,11 @@
         <p:spPr/>
         <p:txBody>
           <a:bodyPr/>
+          <a:lstStyle/>
           <a:p>
             <a:fld id="{B6F15528-21DE-4FAA-801E-634DDDAF4B2B}" type="slidenum">
               <a:rPr/>
+              <a:t>15</a:t>
             </a:fld>
             <a:endParaRPr/>
           </a:p>
@@ -2677,12 +2779,12 @@
           <a:graphicData uri="http://schemas.openxmlformats.org/presentationml/2006/ole">
             <mc:AlternateContent xmlns:mc="http://schemas.openxmlformats.org/markup-compatibility/2006">
               <mc:Choice xmlns:v="urn:schemas-microsoft-com:vml" Requires="v">
-                <p:oleObj spid="_x0000_s8" name="" r:id="rId1" imgW="9705975" imgH="5676900" progId="Paint.Picture">
+                <p:oleObj r:id="rId2" imgW="9705975" imgH="5676900" progId="Paint.Picture">
                   <p:embed/>
                 </p:oleObj>
               </mc:Choice>
               <mc:Fallback>
-                <p:oleObj name="" r:id="rId1" imgW="9705975" imgH="5676900" progId="Paint.Picture">
+                <p:oleObj r:id="rId2" imgW="9705975" imgH="5676900" progId="Paint.Picture">
                   <p:embed/>
                   <p:pic>
                     <p:nvPicPr>
@@ -2691,7 +2793,7 @@
                       <p:nvPr/>
                     </p:nvPicPr>
                     <p:blipFill>
-                      <a:blip r:embed="rId2"/>
+                      <a:blip r:embed="rId3"/>
                       <a:stretch>
                         <a:fillRect/>
                       </a:stretch>
@@ -2750,9 +2852,11 @@
         <p:spPr/>
         <p:txBody>
           <a:bodyPr/>
+          <a:lstStyle/>
           <a:p>
             <a:fld id="{B6F15528-21DE-4FAA-801E-634DDDAF4B2B}" type="slidenum">
               <a:rPr/>
+              <a:t>16</a:t>
             </a:fld>
             <a:endParaRPr/>
           </a:p>
@@ -2772,12 +2876,12 @@
           <a:graphicData uri="http://schemas.openxmlformats.org/presentationml/2006/ole">
             <mc:AlternateContent xmlns:mc="http://schemas.openxmlformats.org/markup-compatibility/2006">
               <mc:Choice xmlns:v="urn:schemas-microsoft-com:vml" Requires="v">
-                <p:oleObj spid="_x0000_s3" name="" r:id="rId1" imgW="9715500" imgH="5705475" progId="Paint.Picture">
+                <p:oleObj r:id="rId2" imgW="9715500" imgH="5705475" progId="Paint.Picture">
                   <p:embed/>
                 </p:oleObj>
               </mc:Choice>
               <mc:Fallback>
-                <p:oleObj name="" r:id="rId1" imgW="9715500" imgH="5705475" progId="Paint.Picture">
+                <p:oleObj r:id="rId2" imgW="9715500" imgH="5705475" progId="Paint.Picture">
                   <p:embed/>
                   <p:pic>
                     <p:nvPicPr>
@@ -2786,7 +2890,7 @@
                       <p:nvPr/>
                     </p:nvPicPr>
                     <p:blipFill>
-                      <a:blip r:embed="rId2"/>
+                      <a:blip r:embed="rId3"/>
                       <a:stretch>
                         <a:fillRect/>
                       </a:stretch>
@@ -2845,9 +2949,11 @@
         <p:spPr/>
         <p:txBody>
           <a:bodyPr/>
+          <a:lstStyle/>
           <a:p>
             <a:fld id="{B6F15528-21DE-4FAA-801E-634DDDAF4B2B}" type="slidenum">
               <a:rPr/>
+              <a:t>17</a:t>
             </a:fld>
             <a:endParaRPr/>
           </a:p>
@@ -2867,12 +2973,12 @@
           <a:graphicData uri="http://schemas.openxmlformats.org/presentationml/2006/ole">
             <mc:AlternateContent xmlns:mc="http://schemas.openxmlformats.org/markup-compatibility/2006">
               <mc:Choice xmlns:v="urn:schemas-microsoft-com:vml" Requires="v">
-                <p:oleObj spid="_x0000_s6" name="" r:id="rId1" imgW="9534525" imgH="5676900" progId="Paint.Picture">
+                <p:oleObj r:id="rId2" imgW="9534525" imgH="5676900" progId="Paint.Picture">
                   <p:embed/>
                 </p:oleObj>
               </mc:Choice>
               <mc:Fallback>
-                <p:oleObj name="" r:id="rId1" imgW="9534525" imgH="5676900" progId="Paint.Picture">
+                <p:oleObj r:id="rId2" imgW="9534525" imgH="5676900" progId="Paint.Picture">
                   <p:embed/>
                   <p:pic>
                     <p:nvPicPr>
@@ -2881,7 +2987,7 @@
                       <p:nvPr/>
                     </p:nvPicPr>
                     <p:blipFill>
-                      <a:blip r:embed="rId2"/>
+                      <a:blip r:embed="rId3"/>
                       <a:stretch>
                         <a:fillRect/>
                       </a:stretch>
@@ -2964,7 +3070,6 @@
               <a:rPr dirty="0"/>
               <a:t>Array Searching and Looping</a:t>
             </a:r>
-            <a:endParaRPr dirty="0"/>
           </a:p>
         </p:txBody>
       </p:sp>
@@ -2981,9 +3086,11 @@
         <p:spPr/>
         <p:txBody>
           <a:bodyPr/>
+          <a:lstStyle/>
           <a:p>
             <a:fld id="{B6F15528-21DE-4FAA-801E-634DDDAF4B2B}" type="slidenum">
               <a:rPr/>
+              <a:t>18</a:t>
             </a:fld>
             <a:endParaRPr/>
           </a:p>
@@ -3027,9 +3134,11 @@
         <p:spPr/>
         <p:txBody>
           <a:bodyPr/>
+          <a:lstStyle/>
           <a:p>
             <a:fld id="{B6F15528-21DE-4FAA-801E-634DDDAF4B2B}" type="slidenum">
               <a:rPr/>
+              <a:t>19</a:t>
             </a:fld>
             <a:endParaRPr/>
           </a:p>
@@ -3049,12 +3158,12 @@
           <a:graphicData uri="http://schemas.openxmlformats.org/presentationml/2006/ole">
             <mc:AlternateContent xmlns:mc="http://schemas.openxmlformats.org/markup-compatibility/2006">
               <mc:Choice xmlns:v="urn:schemas-microsoft-com:vml" Requires="v">
-                <p:oleObj spid="_x0000_s3" name="" r:id="rId1" imgW="9734550" imgH="5591175" progId="Paint.Picture">
+                <p:oleObj r:id="rId2" imgW="9734550" imgH="5591175" progId="Paint.Picture">
                   <p:embed/>
                 </p:oleObj>
               </mc:Choice>
               <mc:Fallback>
-                <p:oleObj name="" r:id="rId1" imgW="9734550" imgH="5591175" progId="Paint.Picture">
+                <p:oleObj r:id="rId2" imgW="9734550" imgH="5591175" progId="Paint.Picture">
                   <p:embed/>
                   <p:pic>
                     <p:nvPicPr>
@@ -3063,7 +3172,7 @@
                       <p:nvPr/>
                     </p:nvPicPr>
                     <p:blipFill>
-                      <a:blip r:embed="rId2"/>
+                      <a:blip r:embed="rId3"/>
                       <a:stretch>
                         <a:fillRect/>
                       </a:stretch>
@@ -3116,7 +3225,7 @@
           <p:nvPr/>
         </p:nvPicPr>
         <p:blipFill>
-          <a:blip r:embed="rId1" cstate="print"/>
+          <a:blip r:embed="rId2" cstate="print"/>
           <a:stretch>
             <a:fillRect/>
           </a:stretch>
@@ -3271,13 +3380,6 @@
               </a:rPr>
               <a:t>slice() and splice()      </a:t>
             </a:r>
-            <a:endParaRPr lang="en-US" sz="2400" spc="10" dirty="0">
-              <a:solidFill>
-                <a:srgbClr val="F05A28"/>
-              </a:solidFill>
-              <a:latin typeface="Verdana" panose="020B0604030504040204"/>
-              <a:cs typeface="Verdana" panose="020B0604030504040204"/>
-            </a:endParaRPr>
           </a:p>
           <a:p>
             <a:pPr marL="12700">
@@ -3362,13 +3464,6 @@
               </a:rPr>
               <a:t>in the DOM</a:t>
             </a:r>
-            <a:endParaRPr lang="en-US" sz="2400" spc="-140" dirty="0">
-              <a:solidFill>
-                <a:srgbClr val="F05A28"/>
-              </a:solidFill>
-              <a:latin typeface="Verdana" panose="020B0604030504040204"/>
-              <a:cs typeface="Verdana" panose="020B0604030504040204"/>
-            </a:endParaRPr>
           </a:p>
         </p:txBody>
       </p:sp>
@@ -3431,9 +3526,11 @@
         <p:spPr/>
         <p:txBody>
           <a:bodyPr/>
+          <a:lstStyle/>
           <a:p>
             <a:fld id="{B6F15528-21DE-4FAA-801E-634DDDAF4B2B}" type="slidenum">
               <a:rPr/>
+              <a:t>2</a:t>
             </a:fld>
             <a:endParaRPr/>
           </a:p>
@@ -3477,9 +3574,11 @@
         <p:spPr/>
         <p:txBody>
           <a:bodyPr/>
+          <a:lstStyle/>
           <a:p>
             <a:fld id="{B6F15528-21DE-4FAA-801E-634DDDAF4B2B}" type="slidenum">
               <a:rPr/>
+              <a:t>20</a:t>
             </a:fld>
             <a:endParaRPr/>
           </a:p>
@@ -3499,12 +3598,12 @@
           <a:graphicData uri="http://schemas.openxmlformats.org/presentationml/2006/ole">
             <mc:AlternateContent xmlns:mc="http://schemas.openxmlformats.org/markup-compatibility/2006">
               <mc:Choice xmlns:v="urn:schemas-microsoft-com:vml" Requires="v">
-                <p:oleObj spid="_x0000_s6" name="" r:id="rId1" imgW="9725025" imgH="5657850" progId="Paint.Picture">
+                <p:oleObj r:id="rId2" imgW="9725025" imgH="5657850" progId="Paint.Picture">
                   <p:embed/>
                 </p:oleObj>
               </mc:Choice>
               <mc:Fallback>
-                <p:oleObj name="" r:id="rId1" imgW="9725025" imgH="5657850" progId="Paint.Picture">
+                <p:oleObj r:id="rId2" imgW="9725025" imgH="5657850" progId="Paint.Picture">
                   <p:embed/>
                   <p:pic>
                     <p:nvPicPr>
@@ -3513,7 +3612,7 @@
                       <p:nvPr/>
                     </p:nvPicPr>
                     <p:blipFill>
-                      <a:blip r:embed="rId2"/>
+                      <a:blip r:embed="rId3"/>
                       <a:stretch>
                         <a:fillRect/>
                       </a:stretch>
@@ -3572,9 +3671,11 @@
         <p:spPr/>
         <p:txBody>
           <a:bodyPr/>
+          <a:lstStyle/>
           <a:p>
             <a:fld id="{B6F15528-21DE-4FAA-801E-634DDDAF4B2B}" type="slidenum">
               <a:rPr/>
+              <a:t>21</a:t>
             </a:fld>
             <a:endParaRPr/>
           </a:p>
@@ -3584,22 +3685,28 @@
         <p:nvGraphicFramePr>
           <p:cNvPr id="2" name="Object 1"/>
           <p:cNvGraphicFramePr/>
-          <p:nvPr/>
+          <p:nvPr>
+            <p:extLst>
+              <p:ext uri="{D42A27DB-BD31-4B8C-83A1-F6EECF244321}">
+                <p14:modId xmlns:p14="http://schemas.microsoft.com/office/powerpoint/2010/main" val="563955121"/>
+              </p:ext>
+            </p:extLst>
+          </p:nvPr>
         </p:nvGraphicFramePr>
         <p:xfrm>
-          <a:off x="1238885" y="593090"/>
+          <a:off x="1239202" y="593090"/>
           <a:ext cx="9713595" cy="5671820"/>
         </p:xfrm>
         <a:graphic>
           <a:graphicData uri="http://schemas.openxmlformats.org/presentationml/2006/ole">
             <mc:AlternateContent xmlns:mc="http://schemas.openxmlformats.org/markup-compatibility/2006">
               <mc:Choice xmlns:v="urn:schemas-microsoft-com:vml" Requires="v">
-                <p:oleObj spid="_x0000_s3" name="" r:id="rId1" imgW="9705975" imgH="5667375" progId="Paint.Picture">
+                <p:oleObj r:id="rId2" imgW="9705975" imgH="5667375" progId="Paint.Picture">
                   <p:embed/>
                 </p:oleObj>
               </mc:Choice>
               <mc:Fallback>
-                <p:oleObj name="" r:id="rId1" imgW="9705975" imgH="5667375" progId="Paint.Picture">
+                <p:oleObj r:id="rId2" imgW="9705975" imgH="5667375" progId="Paint.Picture">
                   <p:embed/>
                   <p:pic>
                     <p:nvPicPr>
@@ -3608,14 +3715,14 @@
                       <p:nvPr/>
                     </p:nvPicPr>
                     <p:blipFill>
-                      <a:blip r:embed="rId2"/>
+                      <a:blip r:embed="rId3"/>
                       <a:stretch>
                         <a:fillRect/>
                       </a:stretch>
                     </p:blipFill>
                     <p:spPr>
                       <a:xfrm>
-                        <a:off x="1238885" y="593090"/>
+                        <a:off x="1239202" y="593090"/>
                         <a:ext cx="9713595" cy="5671820"/>
                       </a:xfrm>
                       <a:prstGeom prst="rect">
@@ -3667,9 +3774,11 @@
         <p:spPr/>
         <p:txBody>
           <a:bodyPr/>
+          <a:lstStyle/>
           <a:p>
             <a:fld id="{B6F15528-21DE-4FAA-801E-634DDDAF4B2B}" type="slidenum">
               <a:rPr/>
+              <a:t>22</a:t>
             </a:fld>
             <a:endParaRPr/>
           </a:p>
@@ -3689,12 +3798,12 @@
           <a:graphicData uri="http://schemas.openxmlformats.org/presentationml/2006/ole">
             <mc:AlternateContent xmlns:mc="http://schemas.openxmlformats.org/markup-compatibility/2006">
               <mc:Choice xmlns:v="urn:schemas-microsoft-com:vml" Requires="v">
-                <p:oleObj spid="_x0000_s6" name="" r:id="rId1" imgW="9582150" imgH="5715000" progId="Paint.Picture">
+                <p:oleObj r:id="rId2" imgW="9582150" imgH="5715000" progId="Paint.Picture">
                   <p:embed/>
                 </p:oleObj>
               </mc:Choice>
               <mc:Fallback>
-                <p:oleObj name="" r:id="rId1" imgW="9582150" imgH="5715000" progId="Paint.Picture">
+                <p:oleObj r:id="rId2" imgW="9582150" imgH="5715000" progId="Paint.Picture">
                   <p:embed/>
                   <p:pic>
                     <p:nvPicPr>
@@ -3703,7 +3812,7 @@
                       <p:nvPr/>
                     </p:nvPicPr>
                     <p:blipFill>
-                      <a:blip r:embed="rId2"/>
+                      <a:blip r:embed="rId3"/>
                       <a:stretch>
                         <a:fillRect/>
                       </a:stretch>
@@ -3786,7 +3895,6 @@
               <a:rPr dirty="0"/>
               <a:t>Arrays in the DOM</a:t>
             </a:r>
-            <a:endParaRPr dirty="0"/>
           </a:p>
         </p:txBody>
       </p:sp>
@@ -3803,9 +3911,11 @@
         <p:spPr/>
         <p:txBody>
           <a:bodyPr/>
+          <a:lstStyle/>
           <a:p>
             <a:fld id="{B6F15528-21DE-4FAA-801E-634DDDAF4B2B}" type="slidenum">
               <a:rPr/>
+              <a:t>23</a:t>
             </a:fld>
             <a:endParaRPr/>
           </a:p>
@@ -3843,7 +3953,7 @@
           <p:nvPr/>
         </p:nvPicPr>
         <p:blipFill>
-          <a:blip r:embed="rId1" cstate="print"/>
+          <a:blip r:embed="rId2" cstate="print"/>
           <a:stretch>
             <a:fillRect/>
           </a:stretch>
@@ -4012,7 +4122,7 @@
               </a:rPr>
               <a:t> Items</a:t>
             </a:r>
-            <a:endParaRPr sz="2400">
+            <a:endParaRPr sz="2400" dirty="0">
               <a:latin typeface="Verdana" panose="020B0604030504040204"/>
               <a:cs typeface="Verdana" panose="020B0604030504040204"/>
             </a:endParaRPr>
@@ -4079,7 +4189,7 @@
               </a:rPr>
               <a:t>[index] - zero based</a:t>
             </a:r>
-            <a:endParaRPr sz="2400">
+            <a:endParaRPr sz="2400" dirty="0">
               <a:latin typeface="Verdana" panose="020B0604030504040204"/>
               <a:cs typeface="Verdana" panose="020B0604030504040204"/>
             </a:endParaRPr>
@@ -4123,7 +4233,7 @@
               </a:rPr>
               <a:t>s</a:t>
             </a:r>
-            <a:endParaRPr sz="2400">
+            <a:endParaRPr sz="2400" dirty="0">
               <a:latin typeface="Verdana" panose="020B0604030504040204"/>
               <a:cs typeface="Verdana" panose="020B0604030504040204"/>
             </a:endParaRPr>
@@ -4184,7 +4294,7 @@
               </a:rPr>
               <a:t>pop()</a:t>
             </a:r>
-            <a:endParaRPr sz="2400">
+            <a:endParaRPr sz="2400" dirty="0">
               <a:latin typeface="Verdana" panose="020B0604030504040204"/>
               <a:cs typeface="Verdana" panose="020B0604030504040204"/>
             </a:endParaRPr>
@@ -4265,13 +4375,6 @@
               </a:rPr>
               <a:t> and unshift()</a:t>
             </a:r>
-            <a:endParaRPr lang="en-US" sz="2400" spc="-145" dirty="0">
-              <a:solidFill>
-                <a:srgbClr val="F05A28"/>
-              </a:solidFill>
-              <a:latin typeface="Verdana" panose="020B0604030504040204"/>
-              <a:cs typeface="Verdana" panose="020B0604030504040204"/>
-            </a:endParaRPr>
           </a:p>
           <a:p>
             <a:pPr marL="541655" indent="-289560">
@@ -4300,64 +4403,54 @@
               <a:t>s</a:t>
             </a:r>
             <a:r>
-              <a:rPr sz="2400" spc="85" dirty="0">
+              <a:rPr sz="2400" spc="-40" dirty="0">
                 <a:solidFill>
                   <a:srgbClr val="F05A28"/>
                 </a:solidFill>
                 <a:latin typeface="Verdana" panose="020B0604030504040204"/>
                 <a:cs typeface="Verdana" panose="020B0604030504040204"/>
               </a:rPr>
-              <a:t>p</a:t>
-            </a:r>
-            <a:r>
-              <a:rPr sz="2400" spc="-40" dirty="0">
+              <a:t>li</a:t>
+            </a:r>
+            <a:r>
+              <a:rPr sz="2400" spc="85" dirty="0">
                 <a:solidFill>
                   <a:srgbClr val="F05A28"/>
                 </a:solidFill>
                 <a:latin typeface="Verdana" panose="020B0604030504040204"/>
                 <a:cs typeface="Verdana" panose="020B0604030504040204"/>
               </a:rPr>
-              <a:t>li</a:t>
-            </a:r>
-            <a:r>
-              <a:rPr sz="2400" spc="85" dirty="0">
+              <a:t>c</a:t>
+            </a:r>
+            <a:r>
+              <a:rPr sz="2400" spc="-10" dirty="0">
                 <a:solidFill>
                   <a:srgbClr val="F05A28"/>
                 </a:solidFill>
                 <a:latin typeface="Verdana" panose="020B0604030504040204"/>
                 <a:cs typeface="Verdana" panose="020B0604030504040204"/>
               </a:rPr>
-              <a:t>c</a:t>
-            </a:r>
-            <a:r>
-              <a:rPr sz="2400" spc="-10" dirty="0">
+              <a:t>e</a:t>
+            </a:r>
+            <a:r>
+              <a:rPr sz="2400" spc="-55" dirty="0">
                 <a:solidFill>
                   <a:srgbClr val="F05A28"/>
                 </a:solidFill>
                 <a:latin typeface="Verdana" panose="020B0604030504040204"/>
                 <a:cs typeface="Verdana" panose="020B0604030504040204"/>
               </a:rPr>
-              <a:t>e</a:t>
-            </a:r>
-            <a:r>
-              <a:rPr sz="2400" spc="-55" dirty="0">
+              <a:t>()</a:t>
+            </a:r>
+            <a:r>
+              <a:rPr lang="en-US" sz="2400" spc="-55" dirty="0">
                 <a:solidFill>
                   <a:srgbClr val="F05A28"/>
                 </a:solidFill>
                 <a:latin typeface="Verdana" panose="020B0604030504040204"/>
                 <a:cs typeface="Verdana" panose="020B0604030504040204"/>
               </a:rPr>
-              <a:t>()</a:t>
-            </a:r>
-            <a:r>
-              <a:rPr lang="en-US" sz="2400" spc="-55" dirty="0">
-                <a:solidFill>
-                  <a:srgbClr val="F05A28"/>
-                </a:solidFill>
-                <a:latin typeface="Verdana" panose="020B0604030504040204"/>
-                <a:cs typeface="Verdana" panose="020B0604030504040204"/>
-              </a:rPr>
-              <a:t> and un</a:t>
+              <a:t> and </a:t>
             </a:r>
             <a:r>
               <a:rPr sz="2400" spc="-60" dirty="0">
@@ -4425,7 +4518,7 @@
               </a:rPr>
               <a:t>()</a:t>
             </a:r>
-            <a:endParaRPr sz="2400">
+            <a:endParaRPr sz="2400" dirty="0">
               <a:latin typeface="Verdana" panose="020B0604030504040204"/>
               <a:cs typeface="Verdana" panose="020B0604030504040204"/>
             </a:endParaRPr>
@@ -4446,7 +4539,7 @@
                 <a:tab pos="541655" algn="l"/>
               </a:tabLst>
             </a:pPr>
-            <a:endParaRPr sz="2400">
+            <a:endParaRPr sz="2400" dirty="0">
               <a:latin typeface="Verdana" panose="020B0604030504040204"/>
               <a:cs typeface="Verdana" panose="020B0604030504040204"/>
             </a:endParaRPr>
@@ -4460,7 +4553,7 @@
                 <a:spcPts val="1785"/>
               </a:spcBef>
             </a:pPr>
-            <a:endParaRPr sz="2400">
+            <a:endParaRPr sz="2400" dirty="0">
               <a:latin typeface="Verdana" panose="020B0604030504040204"/>
               <a:cs typeface="Verdana" panose="020B0604030504040204"/>
             </a:endParaRPr>
@@ -4526,9 +4619,11 @@
         <p:spPr/>
         <p:txBody>
           <a:bodyPr/>
+          <a:lstStyle/>
           <a:p>
             <a:fld id="{B6F15528-21DE-4FAA-801E-634DDDAF4B2B}" type="slidenum">
               <a:rPr/>
+              <a:t>24</a:t>
             </a:fld>
             <a:endParaRPr/>
           </a:p>
@@ -4566,7 +4661,7 @@
           <p:nvPr/>
         </p:nvPicPr>
         <p:blipFill>
-          <a:blip r:embed="rId1" cstate="print"/>
+          <a:blip r:embed="rId2" cstate="print"/>
           <a:stretch>
             <a:fillRect/>
           </a:stretch>
@@ -5146,14 +5241,6 @@
               </a:rPr>
               <a:t>indexOf() and find()</a:t>
             </a:r>
-            <a:endParaRPr lang="en-US" sz="2400" spc="-55" dirty="0">
-              <a:solidFill>
-                <a:srgbClr val="F05A28"/>
-              </a:solidFill>
-              <a:latin typeface="Verdana" panose="020B0604030504040204"/>
-              <a:cs typeface="Verdana" panose="020B0604030504040204"/>
-              <a:sym typeface="+mn-ea"/>
-            </a:endParaRPr>
           </a:p>
           <a:p>
             <a:pPr marL="252095">
@@ -5177,13 +5264,6 @@
               </a:rPr>
               <a:t>		- filter()</a:t>
             </a:r>
-            <a:endParaRPr lang="en-US" sz="2400" spc="-70" dirty="0">
-              <a:solidFill>
-                <a:srgbClr val="F05A28"/>
-              </a:solidFill>
-              <a:latin typeface="Verdana" panose="020B0604030504040204"/>
-              <a:cs typeface="Verdana" panose="020B0604030504040204"/>
-            </a:endParaRPr>
           </a:p>
           <a:p>
             <a:pPr marL="252095">
@@ -5273,13 +5353,6 @@
               </a:rPr>
               <a:t>	- document.getElementsByClassName()</a:t>
             </a:r>
-            <a:endParaRPr lang="en-US" sz="2400" spc="60" dirty="0">
-              <a:solidFill>
-                <a:srgbClr val="F05A28"/>
-              </a:solidFill>
-              <a:latin typeface="Verdana" panose="020B0604030504040204"/>
-              <a:cs typeface="Verdana" panose="020B0604030504040204"/>
-            </a:endParaRPr>
           </a:p>
         </p:txBody>
       </p:sp>
@@ -5342,9 +5415,11 @@
         <p:spPr/>
         <p:txBody>
           <a:bodyPr/>
+          <a:lstStyle/>
           <a:p>
             <a:fld id="{B6F15528-21DE-4FAA-801E-634DDDAF4B2B}" type="slidenum">
               <a:rPr/>
+              <a:t>25</a:t>
             </a:fld>
             <a:endParaRPr/>
           </a:p>
@@ -5416,7 +5491,6 @@
               <a:rPr dirty="0"/>
               <a:t>Creating and Initializing Arrays</a:t>
             </a:r>
-            <a:endParaRPr dirty="0"/>
           </a:p>
         </p:txBody>
       </p:sp>
@@ -5433,9 +5507,11 @@
         <p:spPr/>
         <p:txBody>
           <a:bodyPr/>
+          <a:lstStyle/>
           <a:p>
             <a:fld id="{B6F15528-21DE-4FAA-801E-634DDDAF4B2B}" type="slidenum">
               <a:rPr/>
+              <a:t>3</a:t>
             </a:fld>
             <a:endParaRPr/>
           </a:p>
@@ -5795,9 +5871,11 @@
         <p:spPr/>
         <p:txBody>
           <a:bodyPr/>
+          <a:lstStyle/>
           <a:p>
             <a:fld id="{B6F15528-21DE-4FAA-801E-634DDDAF4B2B}" type="slidenum">
               <a:rPr/>
+              <a:t>4</a:t>
             </a:fld>
             <a:endParaRPr/>
           </a:p>
@@ -6307,11 +6385,6 @@
               </a:rPr>
               <a:t>y</a:t>
             </a:r>
-            <a:endParaRPr spc="-15" dirty="0">
-              <a:solidFill>
-                <a:srgbClr val="404040"/>
-              </a:solidFill>
-            </a:endParaRPr>
           </a:p>
         </p:txBody>
       </p:sp>
@@ -6328,9 +6401,11 @@
         <p:spPr/>
         <p:txBody>
           <a:bodyPr/>
+          <a:lstStyle/>
           <a:p>
             <a:fld id="{B6F15528-21DE-4FAA-801E-634DDDAF4B2B}" type="slidenum">
               <a:rPr/>
+              <a:t>5</a:t>
             </a:fld>
             <a:endParaRPr/>
           </a:p>
@@ -6353,7 +6428,14 @@
         <p:cNvGrpSpPr/>
         <p:nvPr/>
       </p:nvGrpSpPr>
-      <p:grpSpPr/>
+      <p:grpSpPr>
+        <a:xfrm>
+          <a:off x="0" y="0"/>
+          <a:ext cx="0" cy="0"/>
+          <a:chOff x="0" y="0"/>
+          <a:chExt cx="0" cy="0"/>
+        </a:xfrm>
+      </p:grpSpPr>
       <p:sp>
         <p:nvSpPr>
           <p:cNvPr id="4" name="Slide Number Placeholder 3"/>
@@ -6372,9 +6454,11 @@
         </p:spPr>
         <p:txBody>
           <a:bodyPr/>
+          <a:lstStyle/>
           <a:p>
             <a:fld id="{B6F15528-21DE-4FAA-801E-634DDDAF4B2B}" type="slidenum">
               <a:rPr/>
+              <a:t>6</a:t>
             </a:fld>
             <a:endParaRPr/>
           </a:p>
@@ -6394,12 +6478,12 @@
           <a:graphicData uri="http://schemas.openxmlformats.org/presentationml/2006/ole">
             <mc:AlternateContent xmlns:mc="http://schemas.openxmlformats.org/markup-compatibility/2006">
               <mc:Choice xmlns:v="urn:schemas-microsoft-com:vml" Requires="v">
-                <p:oleObj spid="_x0000_s6" name="" r:id="rId1" imgW="10325100" imgH="5181600" progId="Paint.Picture">
+                <p:oleObj r:id="rId2" imgW="10325100" imgH="5181600" progId="Paint.Picture">
                   <p:embed/>
                 </p:oleObj>
               </mc:Choice>
               <mc:Fallback>
-                <p:oleObj name="" r:id="rId1" imgW="10325100" imgH="5181600" progId="Paint.Picture">
+                <p:oleObj r:id="rId2" imgW="10325100" imgH="5181600" progId="Paint.Picture">
                   <p:embed/>
                   <p:pic>
                     <p:nvPicPr>
@@ -6408,7 +6492,7 @@
                       <p:nvPr/>
                     </p:nvPicPr>
                     <p:blipFill>
-                      <a:blip r:embed="rId2"/>
+                      <a:blip r:embed="rId3"/>
                       <a:stretch>
                         <a:fillRect/>
                       </a:stretch>
@@ -6491,7 +6575,6 @@
               <a:rPr lang="en-US" spc="-5" dirty="0"/>
               <a:t>Accessing Array Items</a:t>
             </a:r>
-            <a:endParaRPr lang="en-US" spc="-5" dirty="0"/>
           </a:p>
         </p:txBody>
       </p:sp>
@@ -6508,9 +6591,11 @@
         <p:spPr/>
         <p:txBody>
           <a:bodyPr/>
+          <a:lstStyle/>
           <a:p>
             <a:fld id="{B6F15528-21DE-4FAA-801E-634DDDAF4B2B}" type="slidenum">
               <a:rPr/>
+              <a:t>7</a:t>
             </a:fld>
             <a:endParaRPr/>
           </a:p>
@@ -6774,7 +6859,7 @@
         </p:nvGraphicFramePr>
         <p:xfrm>
           <a:off x="669585" y="3080905"/>
-          <a:ext cx="6943724" cy="2188845"/>
+          <a:ext cx="6943724" cy="2188408"/>
         </p:xfrm>
         <a:graphic>
           <a:graphicData uri="http://schemas.openxmlformats.org/drawingml/2006/table">
@@ -6783,10 +6868,34 @@
                 <a:tableStyleId>{2D5ABB26-0587-4C30-8999-92F81FD0307C}</a:tableStyleId>
               </a:tblPr>
               <a:tblGrid>
-                <a:gridCol w="2313940"/>
-                <a:gridCol w="1825625"/>
-                <a:gridCol w="1037589"/>
-                <a:gridCol w="1766570"/>
+                <a:gridCol w="2313940">
+                  <a:extLst>
+                    <a:ext uri="{9D8B030D-6E8A-4147-A177-3AD203B41FA5}">
+                      <a16:colId xmlns:a16="http://schemas.microsoft.com/office/drawing/2014/main" val="20000"/>
+                    </a:ext>
+                  </a:extLst>
+                </a:gridCol>
+                <a:gridCol w="1825625">
+                  <a:extLst>
+                    <a:ext uri="{9D8B030D-6E8A-4147-A177-3AD203B41FA5}">
+                      <a16:colId xmlns:a16="http://schemas.microsoft.com/office/drawing/2014/main" val="20001"/>
+                    </a:ext>
+                  </a:extLst>
+                </a:gridCol>
+                <a:gridCol w="1037589">
+                  <a:extLst>
+                    <a:ext uri="{9D8B030D-6E8A-4147-A177-3AD203B41FA5}">
+                      <a16:colId xmlns:a16="http://schemas.microsoft.com/office/drawing/2014/main" val="20002"/>
+                    </a:ext>
+                  </a:extLst>
+                </a:gridCol>
+                <a:gridCol w="1766570">
+                  <a:extLst>
+                    <a:ext uri="{9D8B030D-6E8A-4147-A177-3AD203B41FA5}">
+                      <a16:colId xmlns:a16="http://schemas.microsoft.com/office/drawing/2014/main" val="20003"/>
+                    </a:ext>
+                  </a:extLst>
+                </a:gridCol>
               </a:tblGrid>
               <a:tr h="499421">
                 <a:tc>
@@ -6980,13 +7089,6 @@
                         </a:rPr>
                         <a:t>a</a:t>
                       </a:r>
-                      <a:endParaRPr sz="2400" spc="-5" dirty="0">
-                        <a:solidFill>
-                          <a:srgbClr val="77A032"/>
-                        </a:solidFill>
-                        <a:latin typeface="Courier New" panose="02070309020205020404"/>
-                        <a:cs typeface="Courier New" panose="02070309020205020404"/>
-                      </a:endParaRPr>
                     </a:p>
                   </a:txBody>
                   <a:tcPr marL="0" marR="0" marT="14605" marB="0">
@@ -6995,6 +7097,11 @@
                     </a:solidFill>
                   </a:tcPr>
                 </a:tc>
+                <a:extLst>
+                  <a:ext uri="{0D108BD9-81ED-4DB2-BD59-A6C34878D82A}">
+                    <a16:rowId xmlns:a16="http://schemas.microsoft.com/office/drawing/2014/main" val="10000"/>
+                  </a:ext>
+                </a:extLst>
               </a:tr>
               <a:tr h="594751">
                 <a:tc>
@@ -7197,6 +7304,11 @@
                     </a:solidFill>
                   </a:tcPr>
                 </a:tc>
+                <a:extLst>
+                  <a:ext uri="{0D108BD9-81ED-4DB2-BD59-A6C34878D82A}">
+                    <a16:rowId xmlns:a16="http://schemas.microsoft.com/office/drawing/2014/main" val="10001"/>
+                  </a:ext>
+                </a:extLst>
               </a:tr>
               <a:tr h="594783">
                 <a:tc>
@@ -7399,6 +7511,11 @@
                     </a:solidFill>
                   </a:tcPr>
                 </a:tc>
+                <a:extLst>
+                  <a:ext uri="{0D108BD9-81ED-4DB2-BD59-A6C34878D82A}">
+                    <a16:rowId xmlns:a16="http://schemas.microsoft.com/office/drawing/2014/main" val="10002"/>
+                  </a:ext>
+                </a:extLst>
               </a:tr>
               <a:tr h="499453">
                 <a:tc>
@@ -7601,6 +7718,11 @@
                     </a:solidFill>
                   </a:tcPr>
                 </a:tc>
+                <a:extLst>
+                  <a:ext uri="{0D108BD9-81ED-4DB2-BD59-A6C34878D82A}">
+                    <a16:rowId xmlns:a16="http://schemas.microsoft.com/office/drawing/2014/main" val="10003"/>
+                  </a:ext>
+                </a:extLst>
               </a:tr>
             </a:tbl>
           </a:graphicData>
@@ -7679,11 +7801,6 @@
               </a:rPr>
               <a:t>Array</a:t>
             </a:r>
-            <a:endParaRPr spc="-20" dirty="0">
-              <a:solidFill>
-                <a:srgbClr val="404040"/>
-              </a:solidFill>
-            </a:endParaRPr>
           </a:p>
         </p:txBody>
       </p:sp>
@@ -7700,9 +7817,11 @@
         <p:spPr/>
         <p:txBody>
           <a:bodyPr/>
+          <a:lstStyle/>
           <a:p>
             <a:fld id="{B6F15528-21DE-4FAA-801E-634DDDAF4B2B}" type="slidenum">
               <a:rPr/>
+              <a:t>8</a:t>
             </a:fld>
             <a:endParaRPr/>
           </a:p>
@@ -7791,9 +7910,11 @@
         <p:spPr/>
         <p:txBody>
           <a:bodyPr/>
+          <a:lstStyle/>
           <a:p>
             <a:fld id="{B6F15528-21DE-4FAA-801E-634DDDAF4B2B}" type="slidenum">
               <a:rPr/>
+              <a:t>9</a:t>
             </a:fld>
             <a:endParaRPr/>
           </a:p>
@@ -8085,6 +8206,8 @@
       </a:bgFillStyleLst>
     </a:fmtScheme>
   </a:themeElements>
+  <a:objectDefaults/>
+  <a:extraClrSchemeLst/>
   <a:extLst>
     <a:ext uri="{05A4C25C-085E-4340-85A3-A5531E510DB2}">
       <thm15:themeFamily xmlns:thm15="http://schemas.microsoft.com/office/thememl/2012/main" name="Office Theme" id="{62F939B6-93AF-4DB8-9C6B-D6C7DFDC589F}" vid="{4A3C46E8-61CC-4603-A589-7422A47A8E4A}"/>
@@ -8344,6 +8467,8 @@
       </a:bgFillStyleLst>
     </a:fmtScheme>
   </a:themeElements>
+  <a:objectDefaults/>
+  <a:extraClrSchemeLst/>
   <a:extLst>
     <a:ext uri="{05A4C25C-085E-4340-85A3-A5531E510DB2}">
       <thm15:themeFamily xmlns:thm15="http://schemas.microsoft.com/office/thememl/2012/main" name="Office Theme" id="{62F939B6-93AF-4DB8-9C6B-D6C7DFDC589F}" vid="{4A3C46E8-61CC-4603-A589-7422A47A8E4A}"/>

</xml_diff>